<commit_message>
full draft of addendum
</commit_message>
<xml_diff>
--- a/figures/addendum/Fig_Addendum.pptx
+++ b/figures/addendum/Fig_Addendum.pptx
@@ -104,6 +104,11 @@
       </a:defRPr>
     </a:lvl9pPr>
   </p:defaultTextStyle>
+  <p:extLst>
+    <p:ext uri="{EFAFB233-063F-42B5-8137-9DF3F51BA10A}">
+      <p15:sldGuideLst xmlns:p15="http://schemas.microsoft.com/office/powerpoint/2012/main"/>
+    </p:ext>
+  </p:extLst>
 </p:presentation>
 </file>
 
@@ -254,7 +259,7 @@
           <a:p>
             <a:fld id="{ED400A40-A63D-994E-821C-41D301860DE8}" type="datetimeFigureOut">
               <a:rPr lang="en-US" smtClean="0"/>
-              <a:t>6/11/20</a:t>
+              <a:t>6/17/20</a:t>
             </a:fld>
             <a:endParaRPr lang="en-US"/>
           </a:p>
@@ -452,7 +457,7 @@
           <a:p>
             <a:fld id="{ED400A40-A63D-994E-821C-41D301860DE8}" type="datetimeFigureOut">
               <a:rPr lang="en-US" smtClean="0"/>
-              <a:t>6/11/20</a:t>
+              <a:t>6/17/20</a:t>
             </a:fld>
             <a:endParaRPr lang="en-US"/>
           </a:p>
@@ -660,7 +665,7 @@
           <a:p>
             <a:fld id="{ED400A40-A63D-994E-821C-41D301860DE8}" type="datetimeFigureOut">
               <a:rPr lang="en-US" smtClean="0"/>
-              <a:t>6/11/20</a:t>
+              <a:t>6/17/20</a:t>
             </a:fld>
             <a:endParaRPr lang="en-US"/>
           </a:p>
@@ -858,7 +863,7 @@
           <a:p>
             <a:fld id="{ED400A40-A63D-994E-821C-41D301860DE8}" type="datetimeFigureOut">
               <a:rPr lang="en-US" smtClean="0"/>
-              <a:t>6/11/20</a:t>
+              <a:t>6/17/20</a:t>
             </a:fld>
             <a:endParaRPr lang="en-US"/>
           </a:p>
@@ -1133,7 +1138,7 @@
           <a:p>
             <a:fld id="{ED400A40-A63D-994E-821C-41D301860DE8}" type="datetimeFigureOut">
               <a:rPr lang="en-US" smtClean="0"/>
-              <a:t>6/11/20</a:t>
+              <a:t>6/17/20</a:t>
             </a:fld>
             <a:endParaRPr lang="en-US"/>
           </a:p>
@@ -1398,7 +1403,7 @@
           <a:p>
             <a:fld id="{ED400A40-A63D-994E-821C-41D301860DE8}" type="datetimeFigureOut">
               <a:rPr lang="en-US" smtClean="0"/>
-              <a:t>6/11/20</a:t>
+              <a:t>6/17/20</a:t>
             </a:fld>
             <a:endParaRPr lang="en-US"/>
           </a:p>
@@ -1810,7 +1815,7 @@
           <a:p>
             <a:fld id="{ED400A40-A63D-994E-821C-41D301860DE8}" type="datetimeFigureOut">
               <a:rPr lang="en-US" smtClean="0"/>
-              <a:t>6/11/20</a:t>
+              <a:t>6/17/20</a:t>
             </a:fld>
             <a:endParaRPr lang="en-US"/>
           </a:p>
@@ -1951,7 +1956,7 @@
           <a:p>
             <a:fld id="{ED400A40-A63D-994E-821C-41D301860DE8}" type="datetimeFigureOut">
               <a:rPr lang="en-US" smtClean="0"/>
-              <a:t>6/11/20</a:t>
+              <a:t>6/17/20</a:t>
             </a:fld>
             <a:endParaRPr lang="en-US"/>
           </a:p>
@@ -2064,7 +2069,7 @@
           <a:p>
             <a:fld id="{ED400A40-A63D-994E-821C-41D301860DE8}" type="datetimeFigureOut">
               <a:rPr lang="en-US" smtClean="0"/>
-              <a:t>6/11/20</a:t>
+              <a:t>6/17/20</a:t>
             </a:fld>
             <a:endParaRPr lang="en-US"/>
           </a:p>
@@ -2375,7 +2380,7 @@
           <a:p>
             <a:fld id="{ED400A40-A63D-994E-821C-41D301860DE8}" type="datetimeFigureOut">
               <a:rPr lang="en-US" smtClean="0"/>
-              <a:t>6/11/20</a:t>
+              <a:t>6/17/20</a:t>
             </a:fld>
             <a:endParaRPr lang="en-US"/>
           </a:p>
@@ -2663,7 +2668,7 @@
           <a:p>
             <a:fld id="{ED400A40-A63D-994E-821C-41D301860DE8}" type="datetimeFigureOut">
               <a:rPr lang="en-US" smtClean="0"/>
-              <a:t>6/11/20</a:t>
+              <a:t>6/17/20</a:t>
             </a:fld>
             <a:endParaRPr lang="en-US"/>
           </a:p>
@@ -2904,7 +2909,7 @@
           <a:p>
             <a:fld id="{ED400A40-A63D-994E-821C-41D301860DE8}" type="datetimeFigureOut">
               <a:rPr lang="en-US" smtClean="0"/>
-              <a:t>6/11/20</a:t>
+              <a:t>6/17/20</a:t>
             </a:fld>
             <a:endParaRPr lang="en-US"/>
           </a:p>
@@ -3323,10 +3328,10 @@
       </p:grpSpPr>
       <p:grpSp>
         <p:nvGrpSpPr>
-          <p:cNvPr id="27" name="Group 26">
-            <a:extLst>
-              <a:ext uri="{FF2B5EF4-FFF2-40B4-BE49-F238E27FC236}">
-                <a16:creationId xmlns:a16="http://schemas.microsoft.com/office/drawing/2014/main" id="{024AECD8-B894-1443-A38D-7B248947CAB8}"/>
+          <p:cNvPr id="8" name="Group 7">
+            <a:extLst>
+              <a:ext uri="{FF2B5EF4-FFF2-40B4-BE49-F238E27FC236}">
+                <a16:creationId xmlns:a16="http://schemas.microsoft.com/office/drawing/2014/main" id="{154B6719-21A0-814F-BA2C-9FA5405B37E4}"/>
               </a:ext>
             </a:extLst>
           </p:cNvPr>
@@ -3335,123 +3340,18 @@
         </p:nvGrpSpPr>
         <p:grpSpPr>
           <a:xfrm>
-            <a:off x="-63436" y="-1"/>
-            <a:ext cx="8424683" cy="6338415"/>
+            <a:off x="0" y="0"/>
+            <a:ext cx="8311127" cy="5974089"/>
             <a:chOff x="-63436" y="-1"/>
-            <a:chExt cx="8424683" cy="6338415"/>
+            <a:chExt cx="8311127" cy="5974089"/>
           </a:xfrm>
         </p:grpSpPr>
-        <p:sp>
-          <p:nvSpPr>
-            <p:cNvPr id="10" name="TextBox 9">
+        <p:pic>
+          <p:nvPicPr>
+            <p:cNvPr id="3" name="Picture 2" descr="A close up of a map&#10;&#10;Description automatically generated">
               <a:extLst>
                 <a:ext uri="{FF2B5EF4-FFF2-40B4-BE49-F238E27FC236}">
-                  <a16:creationId xmlns:a16="http://schemas.microsoft.com/office/drawing/2014/main" id="{63C3C5DF-C55A-5A4E-8E4D-C68DDA380021}"/>
-                </a:ext>
-              </a:extLst>
-            </p:cNvPr>
-            <p:cNvSpPr txBox="1"/>
-            <p:nvPr/>
-          </p:nvSpPr>
-          <p:spPr>
-            <a:xfrm>
-              <a:off x="-63436" y="0"/>
-              <a:ext cx="433132" cy="584775"/>
-            </a:xfrm>
-            <a:prstGeom prst="rect">
-              <a:avLst/>
-            </a:prstGeom>
-            <a:noFill/>
-          </p:spPr>
-          <p:txBody>
-            <a:bodyPr wrap="none" rtlCol="0">
-              <a:spAutoFit/>
-            </a:bodyPr>
-            <a:lstStyle/>
-            <a:p>
-              <a:r>
-                <a:rPr lang="en-US" sz="3200" b="1" dirty="0"/>
-                <a:t>A</a:t>
-              </a:r>
-            </a:p>
-          </p:txBody>
-        </p:sp>
-        <p:sp>
-          <p:nvSpPr>
-            <p:cNvPr id="11" name="TextBox 10">
-              <a:extLst>
-                <a:ext uri="{FF2B5EF4-FFF2-40B4-BE49-F238E27FC236}">
-                  <a16:creationId xmlns:a16="http://schemas.microsoft.com/office/drawing/2014/main" id="{A5093802-E1E0-9540-A780-4B90F23F2104}"/>
-                </a:ext>
-              </a:extLst>
-            </p:cNvPr>
-            <p:cNvSpPr txBox="1"/>
-            <p:nvPr/>
-          </p:nvSpPr>
-          <p:spPr>
-            <a:xfrm>
-              <a:off x="4334015" y="-1"/>
-              <a:ext cx="415498" cy="584775"/>
-            </a:xfrm>
-            <a:prstGeom prst="rect">
-              <a:avLst/>
-            </a:prstGeom>
-            <a:noFill/>
-          </p:spPr>
-          <p:txBody>
-            <a:bodyPr wrap="none" rtlCol="0">
-              <a:spAutoFit/>
-            </a:bodyPr>
-            <a:lstStyle/>
-            <a:p>
-              <a:r>
-                <a:rPr lang="en-US" sz="3200" b="1" dirty="0"/>
-                <a:t>B</a:t>
-              </a:r>
-            </a:p>
-          </p:txBody>
-        </p:sp>
-        <p:sp>
-          <p:nvSpPr>
-            <p:cNvPr id="12" name="TextBox 11">
-              <a:extLst>
-                <a:ext uri="{FF2B5EF4-FFF2-40B4-BE49-F238E27FC236}">
-                  <a16:creationId xmlns:a16="http://schemas.microsoft.com/office/drawing/2014/main" id="{4DCF2286-4091-8047-A082-723B819621DC}"/>
-                </a:ext>
-              </a:extLst>
-            </p:cNvPr>
-            <p:cNvSpPr txBox="1"/>
-            <p:nvPr/>
-          </p:nvSpPr>
-          <p:spPr>
-            <a:xfrm>
-              <a:off x="-63436" y="3544127"/>
-              <a:ext cx="415498" cy="584775"/>
-            </a:xfrm>
-            <a:prstGeom prst="rect">
-              <a:avLst/>
-            </a:prstGeom>
-            <a:noFill/>
-          </p:spPr>
-          <p:txBody>
-            <a:bodyPr wrap="none" rtlCol="0">
-              <a:spAutoFit/>
-            </a:bodyPr>
-            <a:lstStyle/>
-            <a:p>
-              <a:r>
-                <a:rPr lang="en-US" sz="3200" b="1" dirty="0"/>
-                <a:t>C</a:t>
-              </a:r>
-            </a:p>
-          </p:txBody>
-        </p:sp>
-        <p:pic>
-          <p:nvPicPr>
-            <p:cNvPr id="22" name="Picture 21">
-              <a:extLst>
-                <a:ext uri="{FF2B5EF4-FFF2-40B4-BE49-F238E27FC236}">
-                  <a16:creationId xmlns:a16="http://schemas.microsoft.com/office/drawing/2014/main" id="{D506C70C-3F86-2648-B716-2DA5B801F3B6}"/>
+                  <a16:creationId xmlns:a16="http://schemas.microsoft.com/office/drawing/2014/main" id="{B76003A2-385E-174B-AFDA-4D6C2327FF69}"/>
                 </a:ext>
               </a:extLst>
             </p:cNvPr>
@@ -3468,8 +3368,8 @@
           </p:blipFill>
           <p:spPr>
             <a:xfrm>
-              <a:off x="4767147" y="419927"/>
-              <a:ext cx="3594100" cy="3124200"/>
+              <a:off x="2406838" y="3472188"/>
+              <a:ext cx="4470400" cy="2501900"/>
             </a:xfrm>
             <a:prstGeom prst="rect">
               <a:avLst/>
@@ -3478,10 +3378,10 @@
         </p:pic>
         <p:pic>
           <p:nvPicPr>
-            <p:cNvPr id="24" name="Picture 23">
+            <p:cNvPr id="5" name="Picture 4">
               <a:extLst>
                 <a:ext uri="{FF2B5EF4-FFF2-40B4-BE49-F238E27FC236}">
-                  <a16:creationId xmlns:a16="http://schemas.microsoft.com/office/drawing/2014/main" id="{D0955279-7687-5F47-8FF6-EF818D283C74}"/>
+                  <a16:creationId xmlns:a16="http://schemas.microsoft.com/office/drawing/2014/main" id="{33140C2C-2DD6-AD46-9963-0EC2226D751E}"/>
                 </a:ext>
               </a:extLst>
             </p:cNvPr>
@@ -3498,7 +3398,7 @@
           </p:blipFill>
           <p:spPr>
             <a:xfrm>
-              <a:off x="384315" y="419927"/>
+              <a:off x="257902" y="347988"/>
               <a:ext cx="3949700" cy="3124200"/>
             </a:xfrm>
             <a:prstGeom prst="rect">
@@ -3508,10 +3408,10 @@
         </p:pic>
         <p:pic>
           <p:nvPicPr>
-            <p:cNvPr id="26" name="Picture 25" descr="A close up of a map&#10;&#10;Description automatically generated">
+            <p:cNvPr id="7" name="Picture 6">
               <a:extLst>
                 <a:ext uri="{FF2B5EF4-FFF2-40B4-BE49-F238E27FC236}">
-                  <a16:creationId xmlns:a16="http://schemas.microsoft.com/office/drawing/2014/main" id="{FBCDE7AD-E591-8948-9C0E-08F2FB7B5AA6}"/>
+                  <a16:creationId xmlns:a16="http://schemas.microsoft.com/office/drawing/2014/main" id="{A8A32255-C436-1E48-BE24-747F470035FA}"/>
                 </a:ext>
               </a:extLst>
             </p:cNvPr>
@@ -3528,14 +3428,140 @@
           </p:blipFill>
           <p:spPr>
             <a:xfrm>
-              <a:off x="369696" y="3836514"/>
-              <a:ext cx="4470400" cy="2501900"/>
+              <a:off x="4653591" y="347988"/>
+              <a:ext cx="3594100" cy="3124200"/>
             </a:xfrm>
             <a:prstGeom prst="rect">
               <a:avLst/>
             </a:prstGeom>
           </p:spPr>
         </p:pic>
+        <p:grpSp>
+          <p:nvGrpSpPr>
+            <p:cNvPr id="27" name="Group 26">
+              <a:extLst>
+                <a:ext uri="{FF2B5EF4-FFF2-40B4-BE49-F238E27FC236}">
+                  <a16:creationId xmlns:a16="http://schemas.microsoft.com/office/drawing/2014/main" id="{024AECD8-B894-1443-A38D-7B248947CAB8}"/>
+                </a:ext>
+              </a:extLst>
+            </p:cNvPr>
+            <p:cNvGrpSpPr/>
+            <p:nvPr/>
+          </p:nvGrpSpPr>
+          <p:grpSpPr>
+            <a:xfrm>
+              <a:off x="-63436" y="-1"/>
+              <a:ext cx="4755241" cy="3659832"/>
+              <a:chOff x="-63436" y="-1"/>
+              <a:chExt cx="4755241" cy="3659832"/>
+            </a:xfrm>
+          </p:grpSpPr>
+          <p:sp>
+            <p:nvSpPr>
+              <p:cNvPr id="12" name="TextBox 11">
+                <a:extLst>
+                  <a:ext uri="{FF2B5EF4-FFF2-40B4-BE49-F238E27FC236}">
+                    <a16:creationId xmlns:a16="http://schemas.microsoft.com/office/drawing/2014/main" id="{4DCF2286-4091-8047-A082-723B819621DC}"/>
+                  </a:ext>
+                </a:extLst>
+              </p:cNvPr>
+              <p:cNvSpPr txBox="1"/>
+              <p:nvPr/>
+            </p:nvSpPr>
+            <p:spPr>
+              <a:xfrm>
+                <a:off x="2133361" y="3198166"/>
+                <a:ext cx="348172" cy="461665"/>
+              </a:xfrm>
+              <a:prstGeom prst="rect">
+                <a:avLst/>
+              </a:prstGeom>
+              <a:noFill/>
+            </p:spPr>
+            <p:txBody>
+              <a:bodyPr wrap="none" rtlCol="0">
+                <a:spAutoFit/>
+              </a:bodyPr>
+              <a:lstStyle/>
+              <a:p>
+                <a:r>
+                  <a:rPr lang="en-US" sz="2400" b="1" dirty="0"/>
+                  <a:t>C</a:t>
+                </a:r>
+              </a:p>
+            </p:txBody>
+          </p:sp>
+          <p:sp>
+            <p:nvSpPr>
+              <p:cNvPr id="11" name="TextBox 10">
+                <a:extLst>
+                  <a:ext uri="{FF2B5EF4-FFF2-40B4-BE49-F238E27FC236}">
+                    <a16:creationId xmlns:a16="http://schemas.microsoft.com/office/drawing/2014/main" id="{A5093802-E1E0-9540-A780-4B90F23F2104}"/>
+                  </a:ext>
+                </a:extLst>
+              </p:cNvPr>
+              <p:cNvSpPr txBox="1"/>
+              <p:nvPr/>
+            </p:nvSpPr>
+            <p:spPr>
+              <a:xfrm>
+                <a:off x="4334015" y="-1"/>
+                <a:ext cx="357790" cy="461665"/>
+              </a:xfrm>
+              <a:prstGeom prst="rect">
+                <a:avLst/>
+              </a:prstGeom>
+              <a:noFill/>
+            </p:spPr>
+            <p:txBody>
+              <a:bodyPr wrap="none" rtlCol="0">
+                <a:spAutoFit/>
+              </a:bodyPr>
+              <a:lstStyle/>
+              <a:p>
+                <a:r>
+                  <a:rPr lang="en-US" sz="2400" b="1" dirty="0"/>
+                  <a:t>B</a:t>
+                </a:r>
+              </a:p>
+            </p:txBody>
+          </p:sp>
+          <p:sp>
+            <p:nvSpPr>
+              <p:cNvPr id="10" name="TextBox 9">
+                <a:extLst>
+                  <a:ext uri="{FF2B5EF4-FFF2-40B4-BE49-F238E27FC236}">
+                    <a16:creationId xmlns:a16="http://schemas.microsoft.com/office/drawing/2014/main" id="{63C3C5DF-C55A-5A4E-8E4D-C68DDA380021}"/>
+                  </a:ext>
+                </a:extLst>
+              </p:cNvPr>
+              <p:cNvSpPr txBox="1"/>
+              <p:nvPr/>
+            </p:nvSpPr>
+            <p:spPr>
+              <a:xfrm>
+                <a:off x="-63436" y="0"/>
+                <a:ext cx="370614" cy="461665"/>
+              </a:xfrm>
+              <a:prstGeom prst="rect">
+                <a:avLst/>
+              </a:prstGeom>
+              <a:noFill/>
+            </p:spPr>
+            <p:txBody>
+              <a:bodyPr wrap="none" rtlCol="0">
+                <a:spAutoFit/>
+              </a:bodyPr>
+              <a:lstStyle/>
+              <a:p>
+                <a:r>
+                  <a:rPr lang="en-US" sz="2400" b="1" dirty="0"/>
+                  <a:t>A</a:t>
+                </a:r>
+              </a:p>
+            </p:txBody>
+          </p:sp>
+        </p:grpSp>
       </p:grpSp>
     </p:spTree>
     <p:extLst>

</xml_diff>